<commit_message>
added Week 2 training materials
</commit_message>
<xml_diff>
--- a/Learning Phase/Week 1/Day 4/2. PostgreSQL Data Operations/Slides/1. PostgreSQL Data Operations - Insert, Update, Delete/postgresql-m01-slides.pptx
+++ b/Learning Phase/Week 1/Day 4/2. PostgreSQL Data Operations/Slides/1. PostgreSQL Data Operations - Insert, Update, Delete/postgresql-m01-slides.pptx
@@ -5,18 +5,18 @@
     <p:sldMasterId id="2147483648" r:id="rId1"/>
   </p:sldMasterIdLst>
   <p:notesMasterIdLst>
-    <p:notesMasterId r:id="rId10"/>
+    <p:notesMasterId r:id="rId9"/>
   </p:notesMasterIdLst>
   <p:sldIdLst>
-    <p:sldId id="256" r:id="rId3"/>
-    <p:sldId id="257" r:id="rId4"/>
-    <p:sldId id="258" r:id="rId5"/>
-    <p:sldId id="259" r:id="rId6"/>
-    <p:sldId id="262" r:id="rId7"/>
-    <p:sldId id="263" r:id="rId8"/>
-    <p:sldId id="264" r:id="rId9"/>
+    <p:sldId id="256" r:id="rId2"/>
+    <p:sldId id="257" r:id="rId3"/>
+    <p:sldId id="258" r:id="rId4"/>
+    <p:sldId id="259" r:id="rId5"/>
+    <p:sldId id="262" r:id="rId6"/>
+    <p:sldId id="263" r:id="rId7"/>
+    <p:sldId id="264" r:id="rId8"/>
   </p:sldIdLst>
-  <p:sldSz cx="9144000" cy="6858000"/>
+  <p:sldSz cx="9144000" cy="6858000" type="screen4x3"/>
   <p:notesSz cx="9144000" cy="6858000"/>
   <p:defaultTextStyle>
     <a:lvl1pPr marL="0" algn="l" defTabSz="914400" rtl="0" eaLnBrk="1" latinLnBrk="0" hangingPunct="1">
@@ -110,6 +110,22 @@
       </a:defRPr>
     </a:lvl9pPr>
   </p:defaultTextStyle>
+  <p:extLst>
+    <p:ext uri="{EFAFB233-063F-42B5-8137-9DF3F51BA10A}">
+      <p15:sldGuideLst xmlns:p15="http://schemas.microsoft.com/office/powerpoint/2012/main">
+        <p15:guide id="1" orient="horz" pos="2880">
+          <p15:clr>
+            <a:srgbClr val="A4A3A4"/>
+          </p15:clr>
+        </p15:guide>
+        <p15:guide id="2" pos="2143">
+          <p15:clr>
+            <a:srgbClr val="A4A3A4"/>
+          </p15:clr>
+        </p15:guide>
+      </p15:sldGuideLst>
+    </p:ext>
+  </p:extLst>
 </p:presentation>
 </file>
 
@@ -195,6 +211,7 @@
           <a:p>
             <a:fld id="{3EFD42F7-718C-4B98-AAEC-167E6DDD60A7}" type="datetimeFigureOut">
               <a:rPr lang="en-US" smtClean="0"/>
+              <a:t>12/2/2024</a:t>
             </a:fld>
             <a:endParaRPr lang="en-US"/>
           </a:p>
@@ -258,42 +275,37 @@
           <a:p>
             <a:pPr lvl="0"/>
             <a:r>
-              <a:rPr lang="en-US" smtClean="0"/>
+              <a:rPr lang="en-US"/>
               <a:t>Click to edit Master text styles</a:t>
             </a:r>
-            <a:endParaRPr lang="en-US" smtClean="0"/>
           </a:p>
           <a:p>
             <a:pPr lvl="1"/>
             <a:r>
-              <a:rPr lang="en-US" smtClean="0"/>
+              <a:rPr lang="en-US"/>
               <a:t>Second level</a:t>
             </a:r>
-            <a:endParaRPr lang="en-US" smtClean="0"/>
           </a:p>
           <a:p>
             <a:pPr lvl="2"/>
             <a:r>
-              <a:rPr lang="en-US" smtClean="0"/>
+              <a:rPr lang="en-US"/>
               <a:t>Third level</a:t>
             </a:r>
-            <a:endParaRPr lang="en-US" smtClean="0"/>
           </a:p>
           <a:p>
             <a:pPr lvl="3"/>
             <a:r>
-              <a:rPr lang="en-US" smtClean="0"/>
+              <a:rPr lang="en-US"/>
               <a:t>Fourth level</a:t>
             </a:r>
-            <a:endParaRPr lang="en-US" smtClean="0"/>
           </a:p>
           <a:p>
             <a:pPr lvl="4"/>
             <a:r>
-              <a:rPr lang="en-US" smtClean="0"/>
+              <a:rPr lang="en-US"/>
               <a:t>Fifth level</a:t>
             </a:r>
-            <a:endParaRPr lang="en-US"/>
           </a:p>
         </p:txBody>
       </p:sp>
@@ -357,6 +369,7 @@
           <a:p>
             <a:fld id="{21B2AA4F-B828-4D7C-AFD3-893933DAFCB4}" type="slidenum">
               <a:rPr lang="en-US" smtClean="0"/>
+              <a:t>‹#›</a:t>
             </a:fld>
             <a:endParaRPr lang="en-US"/>
           </a:p>
@@ -505,7 +518,9 @@
               <a:defRPr/>
             </a:lvl1pPr>
           </a:lstStyle>
-          <a:p/>
+          <a:p>
+            <a:endParaRPr/>
+          </a:p>
         </p:txBody>
       </p:sp>
       <p:sp>
@@ -536,7 +551,9 @@
               <a:defRPr/>
             </a:lvl1pPr>
           </a:lstStyle>
-          <a:p/>
+          <a:p>
+            <a:endParaRPr/>
+          </a:p>
         </p:txBody>
       </p:sp>
       <p:sp>
@@ -563,7 +580,9 @@
               </a:defRPr>
             </a:lvl1pPr>
           </a:lstStyle>
-          <a:p/>
+          <a:p>
+            <a:endParaRPr/>
+          </a:p>
         </p:txBody>
       </p:sp>
       <p:sp>
@@ -593,6 +612,7 @@
           <a:p>
             <a:fld id="{1D8BD707-D9CF-40AE-B4C6-C98DA3205C09}" type="datetimeFigureOut">
               <a:rPr lang="en-US"/>
+              <a:t>12/2/2024</a:t>
             </a:fld>
             <a:endParaRPr lang="en-US"/>
           </a:p>
@@ -625,6 +645,7 @@
           <a:p>
             <a:fld id="{B6F15528-21DE-4FAA-801E-634DDDAF4B2B}" type="slidenum">
               <a:rPr/>
+              <a:t>‹#›</a:t>
             </a:fld>
             <a:endParaRPr/>
           </a:p>
@@ -680,7 +701,9 @@
               </a:defRPr>
             </a:lvl1pPr>
           </a:lstStyle>
-          <a:p/>
+          <a:p>
+            <a:endParaRPr/>
+          </a:p>
         </p:txBody>
       </p:sp>
       <p:sp>
@@ -705,7 +728,9 @@
               </a:defRPr>
             </a:lvl1pPr>
           </a:lstStyle>
-          <a:p/>
+          <a:p>
+            <a:endParaRPr/>
+          </a:p>
         </p:txBody>
       </p:sp>
       <p:sp>
@@ -732,7 +757,9 @@
               </a:defRPr>
             </a:lvl1pPr>
           </a:lstStyle>
-          <a:p/>
+          <a:p>
+            <a:endParaRPr/>
+          </a:p>
         </p:txBody>
       </p:sp>
       <p:sp>
@@ -762,6 +789,7 @@
           <a:p>
             <a:fld id="{1D8BD707-D9CF-40AE-B4C6-C98DA3205C09}" type="datetimeFigureOut">
               <a:rPr lang="en-US"/>
+              <a:t>12/2/2024</a:t>
             </a:fld>
             <a:endParaRPr lang="en-US"/>
           </a:p>
@@ -794,6 +822,7 @@
           <a:p>
             <a:fld id="{B6F15528-21DE-4FAA-801E-634DDDAF4B2B}" type="slidenum">
               <a:rPr/>
+              <a:t>‹#›</a:t>
             </a:fld>
             <a:endParaRPr/>
           </a:p>
@@ -849,7 +878,9 @@
               </a:defRPr>
             </a:lvl1pPr>
           </a:lstStyle>
-          <a:p/>
+          <a:p>
+            <a:endParaRPr/>
+          </a:p>
         </p:txBody>
       </p:sp>
       <p:sp>
@@ -880,7 +911,9 @@
               <a:defRPr/>
             </a:lvl1pPr>
           </a:lstStyle>
-          <a:p/>
+          <a:p>
+            <a:endParaRPr/>
+          </a:p>
         </p:txBody>
       </p:sp>
       <p:sp>
@@ -911,7 +944,9 @@
               <a:defRPr/>
             </a:lvl1pPr>
           </a:lstStyle>
-          <a:p/>
+          <a:p>
+            <a:endParaRPr/>
+          </a:p>
         </p:txBody>
       </p:sp>
       <p:sp>
@@ -938,7 +973,9 @@
               </a:defRPr>
             </a:lvl1pPr>
           </a:lstStyle>
-          <a:p/>
+          <a:p>
+            <a:endParaRPr/>
+          </a:p>
         </p:txBody>
       </p:sp>
       <p:sp>
@@ -968,6 +1005,7 @@
           <a:p>
             <a:fld id="{1D8BD707-D9CF-40AE-B4C6-C98DA3205C09}" type="datetimeFigureOut">
               <a:rPr lang="en-US"/>
+              <a:t>12/2/2024</a:t>
             </a:fld>
             <a:endParaRPr lang="en-US"/>
           </a:p>
@@ -1000,6 +1038,7 @@
           <a:p>
             <a:fld id="{B6F15528-21DE-4FAA-801E-634DDDAF4B2B}" type="slidenum">
               <a:rPr/>
+              <a:t>‹#›</a:t>
             </a:fld>
             <a:endParaRPr/>
           </a:p>
@@ -1055,7 +1094,9 @@
               </a:defRPr>
             </a:lvl1pPr>
           </a:lstStyle>
-          <a:p/>
+          <a:p>
+            <a:endParaRPr/>
+          </a:p>
         </p:txBody>
       </p:sp>
       <p:sp>
@@ -1082,7 +1123,9 @@
               </a:defRPr>
             </a:lvl1pPr>
           </a:lstStyle>
-          <a:p/>
+          <a:p>
+            <a:endParaRPr/>
+          </a:p>
         </p:txBody>
       </p:sp>
       <p:sp>
@@ -1112,6 +1155,7 @@
           <a:p>
             <a:fld id="{1D8BD707-D9CF-40AE-B4C6-C98DA3205C09}" type="datetimeFigureOut">
               <a:rPr lang="en-US"/>
+              <a:t>12/2/2024</a:t>
             </a:fld>
             <a:endParaRPr lang="en-US"/>
           </a:p>
@@ -1144,6 +1188,7 @@
           <a:p>
             <a:fld id="{B6F15528-21DE-4FAA-801E-634DDDAF4B2B}" type="slidenum">
               <a:rPr/>
+              <a:t>‹#›</a:t>
             </a:fld>
             <a:endParaRPr/>
           </a:p>
@@ -1199,7 +1244,9 @@
               </a:defRPr>
             </a:lvl1pPr>
           </a:lstStyle>
-          <a:p/>
+          <a:p>
+            <a:endParaRPr/>
+          </a:p>
         </p:txBody>
       </p:sp>
       <p:sp>
@@ -1229,6 +1276,7 @@
           <a:p>
             <a:fld id="{1D8BD707-D9CF-40AE-B4C6-C98DA3205C09}" type="datetimeFigureOut">
               <a:rPr lang="en-US"/>
+              <a:t>12/2/2024</a:t>
             </a:fld>
             <a:endParaRPr lang="en-US"/>
           </a:p>
@@ -1261,6 +1309,7 @@
           <a:p>
             <a:fld id="{B6F15528-21DE-4FAA-801E-634DDDAF4B2B}" type="slidenum">
               <a:rPr/>
+              <a:t>‹#›</a:t>
             </a:fld>
             <a:endParaRPr/>
           </a:p>
@@ -1334,7 +1383,9 @@
               </a:defRPr>
             </a:lvl1pPr>
           </a:lstStyle>
-          <a:p/>
+          <a:p>
+            <a:endParaRPr/>
+          </a:p>
         </p:txBody>
       </p:sp>
       <p:sp>
@@ -1369,7 +1420,9 @@
               </a:defRPr>
             </a:lvl1pPr>
           </a:lstStyle>
-          <a:p/>
+          <a:p>
+            <a:endParaRPr/>
+          </a:p>
         </p:txBody>
       </p:sp>
       <p:sp>
@@ -1406,7 +1459,9 @@
               </a:defRPr>
             </a:lvl1pPr>
           </a:lstStyle>
-          <a:p/>
+          <a:p>
+            <a:endParaRPr/>
+          </a:p>
         </p:txBody>
       </p:sp>
       <p:sp>
@@ -1446,6 +1501,7 @@
           <a:p>
             <a:fld id="{1D8BD707-D9CF-40AE-B4C6-C98DA3205C09}" type="datetimeFigureOut">
               <a:rPr lang="en-US"/>
+              <a:t>12/2/2024</a:t>
             </a:fld>
             <a:endParaRPr lang="en-US"/>
           </a:p>
@@ -1488,6 +1544,7 @@
           <a:p>
             <a:fld id="{B6F15528-21DE-4FAA-801E-634DDDAF4B2B}" type="slidenum">
               <a:rPr/>
+              <a:t>‹#›</a:t>
             </a:fld>
             <a:endParaRPr/>
           </a:p>
@@ -1863,9 +1920,11 @@
         <p:spPr/>
         <p:txBody>
           <a:bodyPr/>
+          <a:lstStyle/>
           <a:p>
             <a:fld id="{B6F15528-21DE-4FAA-801E-634DDDAF4B2B}" type="slidenum">
               <a:rPr/>
+              <a:t>1</a:t>
             </a:fld>
             <a:endParaRPr/>
           </a:p>
@@ -1936,7 +1995,6 @@
               <a:rPr dirty="0"/>
               <a:t>Loading Sample Data</a:t>
             </a:r>
-            <a:endParaRPr dirty="0"/>
           </a:p>
         </p:txBody>
       </p:sp>
@@ -2105,7 +2163,7 @@
               <a:rPr lang="en-US" sz="2400" b="1" spc="-190" dirty="0">
                 <a:latin typeface="Tahoma" panose="020B0604030504040204"/>
                 <a:cs typeface="Tahoma" panose="020B0604030504040204"/>
-                <a:hlinkClick r:id="rId1" action="ppaction://hlinkfile"/>
+                <a:hlinkClick r:id="rId2" action="ppaction://hlinkfile"/>
               </a:rPr>
               <a:t>https://www.postgresqltutorial.com/postgresql-getting-started/postgresql-sample-database/</a:t>
             </a:r>
@@ -2143,10 +2201,6 @@
               </a:rPr>
               <a:t>tart pgAdminIV</a:t>
             </a:r>
-            <a:endParaRPr sz="2400" b="1" dirty="0">
-              <a:latin typeface="Tahoma" panose="020B0604030504040204"/>
-              <a:cs typeface="Tahoma" panose="020B0604030504040204"/>
-            </a:endParaRPr>
           </a:p>
           <a:p>
             <a:pPr marL="355600" indent="-342900">
@@ -2168,7 +2222,28 @@
                 <a:latin typeface="Tahoma" panose="020B0604030504040204"/>
                 <a:cs typeface="Tahoma" panose="020B0604030504040204"/>
               </a:rPr>
-              <a:t>In Command Prompt change to the bin directory where we have installed Postgres</a:t>
+              <a:t>In Command Prompt change to the bin directory where we have installed </a:t>
+            </a:r>
+            <a:r>
+              <a:rPr sz="2400" b="1" dirty="0" err="1">
+                <a:latin typeface="Tahoma" panose="020B0604030504040204"/>
+                <a:cs typeface="Tahoma" panose="020B0604030504040204"/>
+              </a:rPr>
+              <a:t>P</a:t>
+            </a:r>
+            <a:r>
+              <a:rPr lang="en-US" sz="2400" b="1" dirty="0" err="1">
+                <a:latin typeface="Tahoma" panose="020B0604030504040204"/>
+                <a:cs typeface="Tahoma" panose="020B0604030504040204"/>
+              </a:rPr>
+              <a:t>dvdrental</a:t>
+            </a:r>
+            <a:r>
+              <a:rPr sz="2400" b="1" dirty="0" err="1">
+                <a:latin typeface="Tahoma" panose="020B0604030504040204"/>
+                <a:cs typeface="Tahoma" panose="020B0604030504040204"/>
+              </a:rPr>
+              <a:t>ostgres</a:t>
             </a:r>
             <a:r>
               <a:rPr lang="en-US" sz="2400" b="1" dirty="0">
@@ -2177,10 +2252,6 @@
               </a:rPr>
               <a:t>.</a:t>
             </a:r>
-            <a:endParaRPr lang="en-US" sz="2400" b="1" dirty="0">
-              <a:latin typeface="Tahoma" panose="020B0604030504040204"/>
-              <a:cs typeface="Tahoma" panose="020B0604030504040204"/>
-            </a:endParaRPr>
           </a:p>
           <a:p>
             <a:pPr marL="355600" indent="-342900">
@@ -2202,7 +2273,7 @@
                 <a:latin typeface="Tahoma" panose="020B0604030504040204"/>
                 <a:cs typeface="Tahoma" panose="020B0604030504040204"/>
               </a:rPr>
-              <a:t>CREATE DATABASE dvdrental in </a:t>
+              <a:t>CREATE DATABASE in </a:t>
             </a:r>
             <a:r>
               <a:rPr sz="2400" b="1" dirty="0">
@@ -2228,11 +2299,6 @@
               </a:rPr>
               <a:t>IV</a:t>
             </a:r>
-            <a:endParaRPr sz="2400" b="1" dirty="0">
-              <a:latin typeface="Tahoma" panose="020B0604030504040204"/>
-              <a:cs typeface="Tahoma" panose="020B0604030504040204"/>
-              <a:sym typeface="+mn-ea"/>
-            </a:endParaRPr>
           </a:p>
           <a:p>
             <a:pPr marL="355600" indent="-342900">
@@ -2256,10 +2322,6 @@
               </a:rPr>
               <a:t>In cmd, execute pg_restore -U &lt;username&gt; -d dvdrental &lt;location of dvdrental.tar&gt;</a:t>
             </a:r>
-            <a:endParaRPr lang="en-US" sz="2400" b="1" dirty="0">
-              <a:latin typeface="Tahoma" panose="020B0604030504040204"/>
-              <a:cs typeface="Tahoma" panose="020B0604030504040204"/>
-            </a:endParaRPr>
           </a:p>
         </p:txBody>
       </p:sp>
@@ -2276,9 +2338,11 @@
         <p:spPr/>
         <p:txBody>
           <a:bodyPr/>
+          <a:lstStyle/>
           <a:p>
             <a:fld id="{B6F15528-21DE-4FAA-801E-634DDDAF4B2B}" type="slidenum">
               <a:rPr/>
+              <a:t>2</a:t>
             </a:fld>
             <a:endParaRPr/>
           </a:p>
@@ -2293,7 +2357,7 @@
           <p:nvPr/>
         </p:nvPicPr>
         <p:blipFill>
-          <a:blip r:embed="rId2"/>
+          <a:blip r:embed="rId3"/>
           <a:stretch>
             <a:fillRect/>
           </a:stretch>
@@ -2328,6 +2392,7 @@
           <a:bodyPr wrap="square" rtlCol="0">
             <a:spAutoFit/>
           </a:bodyPr>
+          <a:lstStyle/>
           <a:p>
             <a:r>
               <a:rPr lang="en-US" b="1">
@@ -2337,11 +2402,6 @@
               </a:rPr>
               <a:t>Example:</a:t>
             </a:r>
-            <a:endParaRPr lang="en-US" b="1">
-              <a:solidFill>
-                <a:srgbClr val="FF0000"/>
-              </a:solidFill>
-            </a:endParaRPr>
           </a:p>
         </p:txBody>
       </p:sp>
@@ -2451,7 +2511,6 @@
               <a:rPr spc="-190" dirty="0"/>
               <a:t>e</a:t>
             </a:r>
-            <a:endParaRPr spc="-190" dirty="0"/>
           </a:p>
         </p:txBody>
       </p:sp>
@@ -2802,14 +2861,7 @@
                 <a:latin typeface="Tahoma" panose="020B0604030504040204"/>
                 <a:cs typeface="Tahoma" panose="020B0604030504040204"/>
               </a:rPr>
-              <a:t>b</a:t>
-            </a:r>
-            <a:r>
-              <a:rPr sz="2400" b="1" spc="-114" dirty="0">
-                <a:latin typeface="Tahoma" panose="020B0604030504040204"/>
-                <a:cs typeface="Tahoma" panose="020B0604030504040204"/>
-              </a:rPr>
-              <a:t>l</a:t>
+              <a:t>bl</a:t>
             </a:r>
             <a:r>
               <a:rPr sz="2400" b="1" spc="-220" dirty="0">
@@ -2963,14 +3015,7 @@
                 <a:latin typeface="Tahoma" panose="020B0604030504040204"/>
                 <a:cs typeface="Tahoma" panose="020B0604030504040204"/>
               </a:rPr>
-              <a:t>b</a:t>
-            </a:r>
-            <a:r>
-              <a:rPr sz="2400" b="1" spc="-114" dirty="0">
-                <a:latin typeface="Tahoma" panose="020B0604030504040204"/>
-                <a:cs typeface="Tahoma" panose="020B0604030504040204"/>
-              </a:rPr>
-              <a:t>l</a:t>
+              <a:t>bl</a:t>
             </a:r>
             <a:r>
               <a:rPr sz="2400" b="1" spc="-220" dirty="0">
@@ -2999,9 +3044,11 @@
         <p:spPr/>
         <p:txBody>
           <a:bodyPr/>
+          <a:lstStyle/>
           <a:p>
             <a:fld id="{B6F15528-21DE-4FAA-801E-634DDDAF4B2B}" type="slidenum">
               <a:rPr/>
+              <a:t>3</a:t>
             </a:fld>
             <a:endParaRPr/>
           </a:p>
@@ -3113,7 +3160,6 @@
               <a:rPr spc="-95" dirty="0"/>
               <a:t>p</a:t>
             </a:r>
-            <a:endParaRPr spc="-95" dirty="0"/>
           </a:p>
         </p:txBody>
       </p:sp>
@@ -3582,14 +3628,7 @@
                 <a:latin typeface="Tahoma" panose="020B0604030504040204"/>
                 <a:cs typeface="Tahoma" panose="020B0604030504040204"/>
               </a:rPr>
-              <a:t>e</a:t>
-            </a:r>
-            <a:r>
-              <a:rPr sz="2400" b="1" spc="-190" dirty="0">
-                <a:latin typeface="Tahoma" panose="020B0604030504040204"/>
-                <a:cs typeface="Tahoma" panose="020B0604030504040204"/>
-              </a:rPr>
-              <a:t> </a:t>
+              <a:t>e </a:t>
             </a:r>
             <a:r>
               <a:rPr sz="2400" b="1" spc="-330" dirty="0">
@@ -3773,7 +3812,7 @@
           <p:nvPr/>
         </p:nvPicPr>
         <p:blipFill>
-          <a:blip r:embed="rId1" cstate="print"/>
+          <a:blip r:embed="rId2" cstate="print"/>
           <a:stretch>
             <a:fillRect/>
           </a:stretch>
@@ -3923,7 +3962,7 @@
           <p:nvPr/>
         </p:nvPicPr>
         <p:blipFill>
-          <a:blip r:embed="rId2" cstate="print"/>
+          <a:blip r:embed="rId3" cstate="print"/>
           <a:stretch>
             <a:fillRect/>
           </a:stretch>
@@ -4014,7 +4053,7 @@
                 </a:solidFill>
                 <a:latin typeface="Trebuchet MS" panose="020B0603020202020204"/>
                 <a:cs typeface="Trebuchet MS" panose="020B0603020202020204"/>
-                <a:hlinkClick r:id="rId3"/>
+                <a:hlinkClick r:id="rId4"/>
               </a:rPr>
               <a:t>http://www.icons-land.com/</a:t>
             </a:r>
@@ -4038,9 +4077,11 @@
         <p:spPr/>
         <p:txBody>
           <a:bodyPr/>
+          <a:lstStyle/>
           <a:p>
             <a:fld id="{B6F15528-21DE-4FAA-801E-634DDDAF4B2B}" type="slidenum">
               <a:rPr/>
+              <a:t>4</a:t>
             </a:fld>
             <a:endParaRPr/>
           </a:p>
@@ -4140,7 +4181,6 @@
               <a:rPr lang="en-US" spc="-235" dirty="0"/>
               <a:t>1</a:t>
             </a:r>
-            <a:endParaRPr lang="en-US" spc="-235" dirty="0"/>
           </a:p>
         </p:txBody>
       </p:sp>
@@ -4419,14 +4459,7 @@
                 <a:latin typeface="Trebuchet MS" panose="020B0603020202020204"/>
                 <a:cs typeface="Trebuchet MS" panose="020B0603020202020204"/>
               </a:rPr>
-              <a:t>n</a:t>
-            </a:r>
-            <a:r>
-              <a:rPr sz="2200" spc="-45" dirty="0">
-                <a:latin typeface="Trebuchet MS" panose="020B0603020202020204"/>
-                <a:cs typeface="Trebuchet MS" panose="020B0603020202020204"/>
-              </a:rPr>
-              <a:t>a</a:t>
+              <a:t>na</a:t>
             </a:r>
             <a:r>
               <a:rPr sz="2200" spc="-50" dirty="0">
@@ -4797,86 +4830,205 @@
                 <a:latin typeface="Trebuchet MS" panose="020B0603020202020204"/>
                 <a:cs typeface="Trebuchet MS" panose="020B0603020202020204"/>
               </a:rPr>
-              <a:t>h</a:t>
+              <a:t>ha</a:t>
+            </a:r>
+            <a:r>
+              <a:rPr sz="2200" spc="70" dirty="0">
+                <a:latin typeface="Trebuchet MS" panose="020B0603020202020204"/>
+                <a:cs typeface="Trebuchet MS" panose="020B0603020202020204"/>
+              </a:rPr>
+              <a:t>n</a:t>
+            </a:r>
+            <a:r>
+              <a:rPr sz="2200" spc="60" dirty="0">
+                <a:latin typeface="Trebuchet MS" panose="020B0603020202020204"/>
+                <a:cs typeface="Trebuchet MS" panose="020B0603020202020204"/>
+              </a:rPr>
+              <a:t>g</a:t>
+            </a:r>
+            <a:r>
+              <a:rPr sz="2200" spc="-100" dirty="0">
+                <a:latin typeface="Trebuchet MS" panose="020B0603020202020204"/>
+                <a:cs typeface="Trebuchet MS" panose="020B0603020202020204"/>
+              </a:rPr>
+              <a:t>e</a:t>
+            </a:r>
+            <a:r>
+              <a:rPr sz="2200" spc="-180" dirty="0">
+                <a:latin typeface="Trebuchet MS" panose="020B0603020202020204"/>
+                <a:cs typeface="Trebuchet MS" panose="020B0603020202020204"/>
+              </a:rPr>
+              <a:t> </a:t>
             </a:r>
             <a:r>
               <a:rPr sz="2200" spc="-45" dirty="0">
                 <a:latin typeface="Trebuchet MS" panose="020B0603020202020204"/>
                 <a:cs typeface="Trebuchet MS" panose="020B0603020202020204"/>
               </a:rPr>
+              <a:t>na</a:t>
+            </a:r>
+            <a:r>
+              <a:rPr sz="2200" spc="-50" dirty="0">
+                <a:latin typeface="Trebuchet MS" panose="020B0603020202020204"/>
+                <a:cs typeface="Trebuchet MS" panose="020B0603020202020204"/>
+              </a:rPr>
+              <a:t>me</a:t>
+            </a:r>
+            <a:r>
+              <a:rPr sz="2200" spc="-195" dirty="0">
+                <a:latin typeface="Trebuchet MS" panose="020B0603020202020204"/>
+                <a:cs typeface="Trebuchet MS" panose="020B0603020202020204"/>
+              </a:rPr>
+              <a:t> </a:t>
+            </a:r>
+            <a:r>
+              <a:rPr sz="2200" spc="15" dirty="0">
+                <a:latin typeface="Trebuchet MS" panose="020B0603020202020204"/>
+                <a:cs typeface="Trebuchet MS" panose="020B0603020202020204"/>
+              </a:rPr>
+              <a:t>o</a:t>
+            </a:r>
+            <a:r>
+              <a:rPr sz="2200" spc="-175" dirty="0">
+                <a:latin typeface="Trebuchet MS" panose="020B0603020202020204"/>
+                <a:cs typeface="Trebuchet MS" panose="020B0603020202020204"/>
+              </a:rPr>
+              <a:t>f</a:t>
+            </a:r>
+            <a:r>
+              <a:rPr sz="2200" spc="-204" dirty="0">
+                <a:latin typeface="Trebuchet MS" panose="020B0603020202020204"/>
+                <a:cs typeface="Trebuchet MS" panose="020B0603020202020204"/>
+              </a:rPr>
+              <a:t> </a:t>
+            </a:r>
+            <a:r>
+              <a:rPr sz="2200" spc="-80" dirty="0">
+                <a:latin typeface="Trebuchet MS" panose="020B0603020202020204"/>
+                <a:cs typeface="Trebuchet MS" panose="020B0603020202020204"/>
+              </a:rPr>
+              <a:t>the</a:t>
+            </a:r>
+            <a:r>
+              <a:rPr sz="2200" spc="-204" dirty="0">
+                <a:latin typeface="Trebuchet MS" panose="020B0603020202020204"/>
+                <a:cs typeface="Trebuchet MS" panose="020B0603020202020204"/>
+              </a:rPr>
+              <a:t> </a:t>
+            </a:r>
+            <a:r>
+              <a:rPr sz="2200" spc="-105" dirty="0">
+                <a:latin typeface="Trebuchet MS" panose="020B0603020202020204"/>
+                <a:cs typeface="Trebuchet MS" panose="020B0603020202020204"/>
+              </a:rPr>
               <a:t>a</a:t>
             </a:r>
             <a:r>
-              <a:rPr sz="2200" spc="70" dirty="0">
-                <a:latin typeface="Trebuchet MS" panose="020B0603020202020204"/>
-                <a:cs typeface="Trebuchet MS" panose="020B0603020202020204"/>
-              </a:rPr>
-              <a:t>n</a:t>
-            </a:r>
-            <a:r>
-              <a:rPr sz="2200" spc="60" dirty="0">
-                <a:latin typeface="Trebuchet MS" panose="020B0603020202020204"/>
-                <a:cs typeface="Trebuchet MS" panose="020B0603020202020204"/>
-              </a:rPr>
-              <a:t>g</a:t>
-            </a:r>
-            <a:r>
-              <a:rPr sz="2200" spc="-100" dirty="0">
-                <a:latin typeface="Trebuchet MS" panose="020B0603020202020204"/>
-                <a:cs typeface="Trebuchet MS" panose="020B0603020202020204"/>
-              </a:rPr>
-              <a:t>e</a:t>
-            </a:r>
-            <a:r>
-              <a:rPr sz="2200" spc="-180" dirty="0">
-                <a:latin typeface="Trebuchet MS" panose="020B0603020202020204"/>
-                <a:cs typeface="Trebuchet MS" panose="020B0603020202020204"/>
-              </a:rPr>
-              <a:t> </a:t>
-            </a:r>
-            <a:r>
-              <a:rPr sz="2200" spc="-45" dirty="0">
-                <a:latin typeface="Trebuchet MS" panose="020B0603020202020204"/>
-                <a:cs typeface="Trebuchet MS" panose="020B0603020202020204"/>
-              </a:rPr>
-              <a:t>n</a:t>
-            </a:r>
-            <a:r>
-              <a:rPr sz="2200" spc="-45" dirty="0">
+              <a:rPr sz="2200" spc="-110" dirty="0">
+                <a:latin typeface="Trebuchet MS" panose="020B0603020202020204"/>
+                <a:cs typeface="Trebuchet MS" panose="020B0603020202020204"/>
+              </a:rPr>
+              <a:t>c</a:t>
+            </a:r>
+            <a:r>
+              <a:rPr sz="2200" spc="-55" dirty="0">
+                <a:latin typeface="Trebuchet MS" panose="020B0603020202020204"/>
+                <a:cs typeface="Trebuchet MS" panose="020B0603020202020204"/>
+              </a:rPr>
+              <a:t>t</a:t>
+            </a:r>
+            <a:r>
+              <a:rPr sz="2200" spc="-80" dirty="0">
+                <a:latin typeface="Trebuchet MS" panose="020B0603020202020204"/>
+                <a:cs typeface="Trebuchet MS" panose="020B0603020202020204"/>
+              </a:rPr>
+              <a:t>o</a:t>
+            </a:r>
+            <a:r>
+              <a:rPr sz="2200" spc="-140" dirty="0">
+                <a:latin typeface="Trebuchet MS" panose="020B0603020202020204"/>
+                <a:cs typeface="Trebuchet MS" panose="020B0603020202020204"/>
+              </a:rPr>
+              <a:t>r</a:t>
+            </a:r>
+            <a:r>
+              <a:rPr sz="2200" spc="-185" dirty="0">
+                <a:latin typeface="Trebuchet MS" panose="020B0603020202020204"/>
+                <a:cs typeface="Trebuchet MS" panose="020B0603020202020204"/>
+              </a:rPr>
+              <a:t> f</a:t>
+            </a:r>
+            <a:r>
+              <a:rPr sz="2200" spc="-140" dirty="0">
+                <a:latin typeface="Trebuchet MS" panose="020B0603020202020204"/>
+                <a:cs typeface="Trebuchet MS" panose="020B0603020202020204"/>
+              </a:rPr>
+              <a:t>r</a:t>
+            </a:r>
+            <a:r>
+              <a:rPr sz="2200" spc="15" dirty="0">
+                <a:latin typeface="Trebuchet MS" panose="020B0603020202020204"/>
+                <a:cs typeface="Trebuchet MS" panose="020B0603020202020204"/>
+              </a:rPr>
+              <a:t>o</a:t>
+            </a:r>
+            <a:r>
+              <a:rPr sz="2200" spc="5" dirty="0">
+                <a:latin typeface="Trebuchet MS" panose="020B0603020202020204"/>
+                <a:cs typeface="Trebuchet MS" panose="020B0603020202020204"/>
+              </a:rPr>
+              <a:t>m</a:t>
+            </a:r>
+            <a:r>
+              <a:rPr sz="2200" spc="-165" dirty="0">
+                <a:latin typeface="Trebuchet MS" panose="020B0603020202020204"/>
+                <a:cs typeface="Trebuchet MS" panose="020B0603020202020204"/>
+              </a:rPr>
+              <a:t> </a:t>
+            </a:r>
+            <a:r>
+              <a:rPr sz="2200" i="1" spc="-95" dirty="0">
+                <a:latin typeface="Trebuchet MS" panose="020B0603020202020204"/>
+                <a:cs typeface="Trebuchet MS" panose="020B0603020202020204"/>
+              </a:rPr>
+              <a:t>C</a:t>
+            </a:r>
+            <a:r>
+              <a:rPr sz="2200" i="1" spc="-80" dirty="0">
+                <a:latin typeface="Trebuchet MS" panose="020B0603020202020204"/>
+                <a:cs typeface="Trebuchet MS" panose="020B0603020202020204"/>
+              </a:rPr>
+              <a:t>ub</a:t>
+            </a:r>
+            <a:r>
+              <a:rPr sz="2200" i="1" spc="-10" dirty="0">
                 <a:latin typeface="Trebuchet MS" panose="020B0603020202020204"/>
                 <a:cs typeface="Trebuchet MS" panose="020B0603020202020204"/>
               </a:rPr>
               <a:t>a</a:t>
             </a:r>
             <a:r>
-              <a:rPr sz="2200" spc="-50" dirty="0">
-                <a:latin typeface="Trebuchet MS" panose="020B0603020202020204"/>
-                <a:cs typeface="Trebuchet MS" panose="020B0603020202020204"/>
-              </a:rPr>
-              <a:t>me</a:t>
-            </a:r>
-            <a:r>
-              <a:rPr sz="2200" spc="-195" dirty="0">
-                <a:latin typeface="Trebuchet MS" panose="020B0603020202020204"/>
-                <a:cs typeface="Trebuchet MS" panose="020B0603020202020204"/>
-              </a:rPr>
-              <a:t> </a:t>
-            </a:r>
-            <a:r>
-              <a:rPr sz="2200" spc="15" dirty="0">
+              <a:rPr sz="2200" i="1" spc="-195" dirty="0">
+                <a:latin typeface="Trebuchet MS" panose="020B0603020202020204"/>
+                <a:cs typeface="Trebuchet MS" panose="020B0603020202020204"/>
+              </a:rPr>
+              <a:t> </a:t>
+            </a:r>
+            <a:r>
+              <a:rPr sz="2200" spc="-145" dirty="0">
+                <a:latin typeface="Trebuchet MS" panose="020B0603020202020204"/>
+                <a:cs typeface="Trebuchet MS" panose="020B0603020202020204"/>
+              </a:rPr>
+              <a:t>t</a:t>
+            </a:r>
+            <a:r>
+              <a:rPr sz="2200" spc="25" dirty="0">
                 <a:latin typeface="Trebuchet MS" panose="020B0603020202020204"/>
                 <a:cs typeface="Trebuchet MS" panose="020B0603020202020204"/>
               </a:rPr>
               <a:t>o</a:t>
             </a:r>
             <a:r>
-              <a:rPr sz="2200" spc="-175" dirty="0">
-                <a:latin typeface="Trebuchet MS" panose="020B0603020202020204"/>
-                <a:cs typeface="Trebuchet MS" panose="020B0603020202020204"/>
-              </a:rPr>
-              <a:t>f</a:t>
-            </a:r>
-            <a:r>
               <a:rPr sz="2200" spc="-204" dirty="0">
                 <a:latin typeface="Trebuchet MS" panose="020B0603020202020204"/>
                 <a:cs typeface="Trebuchet MS" panose="020B0603020202020204"/>
@@ -4884,172 +5036,25 @@
               <a:t> </a:t>
             </a:r>
             <a:r>
-              <a:rPr sz="2200" spc="-80" dirty="0">
-                <a:latin typeface="Trebuchet MS" panose="020B0603020202020204"/>
-                <a:cs typeface="Trebuchet MS" panose="020B0603020202020204"/>
-              </a:rPr>
-              <a:t>the</a:t>
-            </a:r>
-            <a:r>
-              <a:rPr sz="2200" spc="-204" dirty="0">
-                <a:latin typeface="Trebuchet MS" panose="020B0603020202020204"/>
-                <a:cs typeface="Trebuchet MS" panose="020B0603020202020204"/>
-              </a:rPr>
-              <a:t> </a:t>
-            </a:r>
-            <a:r>
-              <a:rPr sz="2200" spc="-105" dirty="0">
+              <a:rPr sz="2200" i="1" spc="-250" dirty="0">
+                <a:latin typeface="Trebuchet MS" panose="020B0603020202020204"/>
+                <a:cs typeface="Trebuchet MS" panose="020B0603020202020204"/>
+              </a:rPr>
+              <a:t>J</a:t>
+            </a:r>
+            <a:r>
+              <a:rPr sz="2200" i="1" spc="-45" dirty="0">
                 <a:latin typeface="Trebuchet MS" panose="020B0603020202020204"/>
                 <a:cs typeface="Trebuchet MS" panose="020B0603020202020204"/>
               </a:rPr>
               <a:t>a</a:t>
             </a:r>
             <a:r>
-              <a:rPr sz="2200" spc="-110" dirty="0">
-                <a:latin typeface="Trebuchet MS" panose="020B0603020202020204"/>
-                <a:cs typeface="Trebuchet MS" panose="020B0603020202020204"/>
-              </a:rPr>
-              <a:t>c</a:t>
-            </a:r>
-            <a:r>
-              <a:rPr sz="2200" spc="-55" dirty="0">
-                <a:latin typeface="Trebuchet MS" panose="020B0603020202020204"/>
-                <a:cs typeface="Trebuchet MS" panose="020B0603020202020204"/>
-              </a:rPr>
-              <a:t>t</a:t>
-            </a:r>
-            <a:r>
-              <a:rPr sz="2200" spc="-80" dirty="0">
-                <a:latin typeface="Trebuchet MS" panose="020B0603020202020204"/>
-                <a:cs typeface="Trebuchet MS" panose="020B0603020202020204"/>
-              </a:rPr>
-              <a:t>o</a:t>
-            </a:r>
-            <a:r>
-              <a:rPr sz="2200" spc="-140" dirty="0">
-                <a:latin typeface="Trebuchet MS" panose="020B0603020202020204"/>
-                <a:cs typeface="Trebuchet MS" panose="020B0603020202020204"/>
-              </a:rPr>
-              <a:t>r</a:t>
-            </a:r>
-            <a:r>
-              <a:rPr sz="2200" spc="-185" dirty="0">
-                <a:latin typeface="Trebuchet MS" panose="020B0603020202020204"/>
-                <a:cs typeface="Trebuchet MS" panose="020B0603020202020204"/>
-              </a:rPr>
-              <a:t> </a:t>
-            </a:r>
-            <a:r>
-              <a:rPr sz="2200" spc="-185" dirty="0">
-                <a:latin typeface="Trebuchet MS" panose="020B0603020202020204"/>
-                <a:cs typeface="Trebuchet MS" panose="020B0603020202020204"/>
-              </a:rPr>
-              <a:t>f</a:t>
-            </a:r>
-            <a:r>
-              <a:rPr sz="2200" spc="-140" dirty="0">
-                <a:latin typeface="Trebuchet MS" panose="020B0603020202020204"/>
-                <a:cs typeface="Trebuchet MS" panose="020B0603020202020204"/>
-              </a:rPr>
-              <a:t>r</a:t>
-            </a:r>
-            <a:r>
-              <a:rPr sz="2200" spc="15" dirty="0">
-                <a:latin typeface="Trebuchet MS" panose="020B0603020202020204"/>
-                <a:cs typeface="Trebuchet MS" panose="020B0603020202020204"/>
-              </a:rPr>
-              <a:t>o</a:t>
-            </a:r>
-            <a:r>
-              <a:rPr sz="2200" spc="5" dirty="0">
-                <a:latin typeface="Trebuchet MS" panose="020B0603020202020204"/>
-                <a:cs typeface="Trebuchet MS" panose="020B0603020202020204"/>
-              </a:rPr>
-              <a:t>m</a:t>
-            </a:r>
-            <a:r>
-              <a:rPr sz="2200" spc="-165" dirty="0">
-                <a:latin typeface="Trebuchet MS" panose="020B0603020202020204"/>
-                <a:cs typeface="Trebuchet MS" panose="020B0603020202020204"/>
-              </a:rPr>
-              <a:t> </a:t>
-            </a:r>
-            <a:r>
-              <a:rPr sz="2200" i="1" spc="-95" dirty="0">
-                <a:latin typeface="Trebuchet MS" panose="020B0603020202020204"/>
-                <a:cs typeface="Trebuchet MS" panose="020B0603020202020204"/>
-              </a:rPr>
-              <a:t>C</a:t>
-            </a:r>
-            <a:r>
-              <a:rPr sz="2200" i="1" spc="-80" dirty="0">
-                <a:latin typeface="Trebuchet MS" panose="020B0603020202020204"/>
-                <a:cs typeface="Trebuchet MS" panose="020B0603020202020204"/>
-              </a:rPr>
-              <a:t>ub</a:t>
-            </a:r>
-            <a:r>
-              <a:rPr sz="2200" i="1" spc="-10" dirty="0">
-                <a:latin typeface="Trebuchet MS" panose="020B0603020202020204"/>
-                <a:cs typeface="Trebuchet MS" panose="020B0603020202020204"/>
-              </a:rPr>
-              <a:t>a</a:t>
-            </a:r>
-            <a:r>
-              <a:rPr sz="2200" i="1" spc="-195" dirty="0">
-                <a:latin typeface="Trebuchet MS" panose="020B0603020202020204"/>
-                <a:cs typeface="Trebuchet MS" panose="020B0603020202020204"/>
-              </a:rPr>
-              <a:t> </a:t>
-            </a:r>
-            <a:r>
-              <a:rPr sz="2200" spc="-145" dirty="0">
-                <a:latin typeface="Trebuchet MS" panose="020B0603020202020204"/>
-                <a:cs typeface="Trebuchet MS" panose="020B0603020202020204"/>
-              </a:rPr>
-              <a:t>t</a:t>
-            </a:r>
-            <a:r>
-              <a:rPr sz="2200" spc="25" dirty="0">
-                <a:latin typeface="Trebuchet MS" panose="020B0603020202020204"/>
-                <a:cs typeface="Trebuchet MS" panose="020B0603020202020204"/>
-              </a:rPr>
-              <a:t>o</a:t>
-            </a:r>
-            <a:r>
-              <a:rPr sz="2200" spc="-204" dirty="0">
-                <a:latin typeface="Trebuchet MS" panose="020B0603020202020204"/>
-                <a:cs typeface="Trebuchet MS" panose="020B0603020202020204"/>
-              </a:rPr>
-              <a:t> </a:t>
-            </a:r>
-            <a:r>
-              <a:rPr sz="2200" i="1" spc="-250" dirty="0">
-                <a:latin typeface="Trebuchet MS" panose="020B0603020202020204"/>
-                <a:cs typeface="Trebuchet MS" panose="020B0603020202020204"/>
-              </a:rPr>
-              <a:t>J</a:t>
-            </a:r>
-            <a:r>
-              <a:rPr sz="2200" i="1" spc="-45" dirty="0">
-                <a:latin typeface="Trebuchet MS" panose="020B0603020202020204"/>
-                <a:cs typeface="Trebuchet MS" panose="020B0603020202020204"/>
-              </a:rPr>
-              <a:t>a</a:t>
-            </a:r>
-            <a:r>
               <a:rPr sz="2200" i="1" spc="-50" dirty="0">
                 <a:latin typeface="Trebuchet MS" panose="020B0603020202020204"/>
                 <a:cs typeface="Trebuchet MS" panose="020B0603020202020204"/>
               </a:rPr>
-              <a:t>c</a:t>
-            </a:r>
-            <a:r>
-              <a:rPr sz="2200" i="1" spc="-50" dirty="0">
-                <a:latin typeface="Trebuchet MS" panose="020B0603020202020204"/>
-                <a:cs typeface="Trebuchet MS" panose="020B0603020202020204"/>
-              </a:rPr>
-              <a:t>ob</a:t>
+              <a:t>cob</a:t>
             </a:r>
             <a:endParaRPr sz="2200">
               <a:latin typeface="Trebuchet MS" panose="020B0603020202020204"/>
@@ -5070,140 +5075,273 @@
                 <a:latin typeface="Trebuchet MS" panose="020B0603020202020204"/>
                 <a:cs typeface="Trebuchet MS" panose="020B0603020202020204"/>
               </a:rPr>
-              <a:t>S</a:t>
+              <a:t>Su</a:t>
+            </a:r>
+            <a:r>
+              <a:rPr sz="2200" spc="10" dirty="0">
+                <a:latin typeface="Trebuchet MS" panose="020B0603020202020204"/>
+                <a:cs typeface="Trebuchet MS" panose="020B0603020202020204"/>
+              </a:rPr>
+              <a:t>b</a:t>
+            </a:r>
+            <a:r>
+              <a:rPr sz="2200" spc="-145" dirty="0">
+                <a:latin typeface="Trebuchet MS" panose="020B0603020202020204"/>
+                <a:cs typeface="Trebuchet MS" panose="020B0603020202020204"/>
+              </a:rPr>
+              <a:t>t</a:t>
+            </a:r>
+            <a:r>
+              <a:rPr sz="2200" spc="-105" dirty="0">
+                <a:latin typeface="Trebuchet MS" panose="020B0603020202020204"/>
+                <a:cs typeface="Trebuchet MS" panose="020B0603020202020204"/>
+              </a:rPr>
+              <a:t>a</a:t>
+            </a:r>
+            <a:r>
+              <a:rPr sz="2200" spc="-35" dirty="0">
+                <a:latin typeface="Trebuchet MS" panose="020B0603020202020204"/>
+                <a:cs typeface="Trebuchet MS" panose="020B0603020202020204"/>
+              </a:rPr>
+              <a:t>s</a:t>
+            </a:r>
+            <a:r>
+              <a:rPr sz="2200" spc="-80" dirty="0">
+                <a:latin typeface="Trebuchet MS" panose="020B0603020202020204"/>
+                <a:cs typeface="Trebuchet MS" panose="020B0603020202020204"/>
+              </a:rPr>
+              <a:t>k</a:t>
+            </a:r>
+            <a:r>
+              <a:rPr sz="2200" spc="-170" dirty="0">
+                <a:latin typeface="Trebuchet MS" panose="020B0603020202020204"/>
+                <a:cs typeface="Trebuchet MS" panose="020B0603020202020204"/>
+              </a:rPr>
+              <a:t> </a:t>
+            </a:r>
+            <a:r>
+              <a:rPr sz="2200" spc="-195" dirty="0">
+                <a:latin typeface="Trebuchet MS" panose="020B0603020202020204"/>
+                <a:cs typeface="Trebuchet MS" panose="020B0603020202020204"/>
+              </a:rPr>
+              <a:t>2:</a:t>
+            </a:r>
+            <a:r>
+              <a:rPr sz="2200" spc="-220" dirty="0">
+                <a:latin typeface="Trebuchet MS" panose="020B0603020202020204"/>
+                <a:cs typeface="Trebuchet MS" panose="020B0603020202020204"/>
+              </a:rPr>
+              <a:t> </a:t>
+            </a:r>
+            <a:r>
+              <a:rPr sz="2200" spc="-90" dirty="0">
+                <a:latin typeface="Trebuchet MS" panose="020B0603020202020204"/>
+                <a:cs typeface="Trebuchet MS" panose="020B0603020202020204"/>
+              </a:rPr>
+              <a:t>I</a:t>
+            </a:r>
+            <a:r>
+              <a:rPr sz="2200" spc="-5" dirty="0">
+                <a:latin typeface="Trebuchet MS" panose="020B0603020202020204"/>
+                <a:cs typeface="Trebuchet MS" panose="020B0603020202020204"/>
+              </a:rPr>
+              <a:t>n</a:t>
+            </a:r>
+            <a:r>
+              <a:rPr sz="2200" spc="-15" dirty="0">
+                <a:latin typeface="Trebuchet MS" panose="020B0603020202020204"/>
+                <a:cs typeface="Trebuchet MS" panose="020B0603020202020204"/>
+              </a:rPr>
+              <a:t>s</a:t>
+            </a:r>
+            <a:r>
+              <a:rPr sz="2200" spc="-120" dirty="0">
+                <a:latin typeface="Trebuchet MS" panose="020B0603020202020204"/>
+                <a:cs typeface="Trebuchet MS" panose="020B0603020202020204"/>
+              </a:rPr>
+              <a:t>er</a:t>
+            </a:r>
+            <a:r>
+              <a:rPr sz="2200" spc="-150" dirty="0">
+                <a:latin typeface="Trebuchet MS" panose="020B0603020202020204"/>
+                <a:cs typeface="Trebuchet MS" panose="020B0603020202020204"/>
+              </a:rPr>
+              <a:t>t</a:t>
+            </a:r>
+            <a:r>
+              <a:rPr sz="2200" spc="-195" dirty="0">
+                <a:latin typeface="Trebuchet MS" panose="020B0603020202020204"/>
+                <a:cs typeface="Trebuchet MS" panose="020B0603020202020204"/>
+              </a:rPr>
+              <a:t> </a:t>
+            </a:r>
+            <a:r>
+              <a:rPr sz="2200" spc="-100" dirty="0">
+                <a:latin typeface="Trebuchet MS" panose="020B0603020202020204"/>
+                <a:cs typeface="Trebuchet MS" panose="020B0603020202020204"/>
+              </a:rPr>
+              <a:t>a</a:t>
+            </a:r>
+            <a:r>
+              <a:rPr sz="2200" spc="-200" dirty="0">
+                <a:latin typeface="Trebuchet MS" panose="020B0603020202020204"/>
+                <a:cs typeface="Trebuchet MS" panose="020B0603020202020204"/>
+              </a:rPr>
+              <a:t> </a:t>
+            </a:r>
+            <a:r>
+              <a:rPr sz="2200" spc="-35" dirty="0">
+                <a:latin typeface="Trebuchet MS" panose="020B0603020202020204"/>
+                <a:cs typeface="Trebuchet MS" panose="020B0603020202020204"/>
+              </a:rPr>
+              <a:t>new</a:t>
+            </a:r>
+            <a:r>
+              <a:rPr sz="2200" spc="-195" dirty="0">
+                <a:latin typeface="Trebuchet MS" panose="020B0603020202020204"/>
+                <a:cs typeface="Trebuchet MS" panose="020B0603020202020204"/>
+              </a:rPr>
+              <a:t> </a:t>
+            </a:r>
+            <a:r>
+              <a:rPr sz="2200" spc="-140" dirty="0">
+                <a:latin typeface="Trebuchet MS" panose="020B0603020202020204"/>
+                <a:cs typeface="Trebuchet MS" panose="020B0603020202020204"/>
+              </a:rPr>
+              <a:t>r</a:t>
             </a:r>
             <a:r>
               <a:rPr sz="2200" spc="15" dirty="0">
                 <a:latin typeface="Trebuchet MS" panose="020B0603020202020204"/>
                 <a:cs typeface="Trebuchet MS" panose="020B0603020202020204"/>
               </a:rPr>
-              <a:t>u</a:t>
-            </a:r>
-            <a:r>
-              <a:rPr sz="2200" spc="10" dirty="0">
+              <a:t>o</a:t>
+            </a:r>
+            <a:r>
+              <a:rPr sz="2200" spc="-25" dirty="0">
+                <a:latin typeface="Trebuchet MS" panose="020B0603020202020204"/>
+                <a:cs typeface="Trebuchet MS" panose="020B0603020202020204"/>
+              </a:rPr>
+              <a:t>w</a:t>
+            </a:r>
+            <a:r>
+              <a:rPr sz="2200" spc="-170" dirty="0">
+                <a:latin typeface="Trebuchet MS" panose="020B0603020202020204"/>
+                <a:cs typeface="Trebuchet MS" panose="020B0603020202020204"/>
+              </a:rPr>
+              <a:t> </a:t>
+            </a:r>
+            <a:r>
+              <a:rPr sz="2200" spc="-114" dirty="0">
+                <a:latin typeface="Trebuchet MS" panose="020B0603020202020204"/>
+                <a:cs typeface="Trebuchet MS" panose="020B0603020202020204"/>
+              </a:rPr>
+              <a:t>i</a:t>
+            </a:r>
+            <a:r>
+              <a:rPr sz="2200" spc="-35" dirty="0">
+                <a:latin typeface="Trebuchet MS" panose="020B0603020202020204"/>
+                <a:cs typeface="Trebuchet MS" panose="020B0603020202020204"/>
+              </a:rPr>
+              <a:t>nto</a:t>
+            </a:r>
+            <a:r>
+              <a:rPr sz="2200" spc="-215" dirty="0">
+                <a:latin typeface="Trebuchet MS" panose="020B0603020202020204"/>
+                <a:cs typeface="Trebuchet MS" panose="020B0603020202020204"/>
+              </a:rPr>
+              <a:t> </a:t>
+            </a:r>
+            <a:r>
+              <a:rPr sz="2200" spc="-105" dirty="0">
+                <a:latin typeface="Trebuchet MS" panose="020B0603020202020204"/>
+                <a:cs typeface="Trebuchet MS" panose="020B0603020202020204"/>
+              </a:rPr>
+              <a:t>t</a:t>
+            </a:r>
+            <a:r>
+              <a:rPr sz="2200" spc="-145" dirty="0">
+                <a:latin typeface="Trebuchet MS" panose="020B0603020202020204"/>
+                <a:cs typeface="Trebuchet MS" panose="020B0603020202020204"/>
+              </a:rPr>
+              <a:t>a</a:t>
+            </a:r>
+            <a:r>
+              <a:rPr sz="2200" spc="15" dirty="0">
                 <a:latin typeface="Trebuchet MS" panose="020B0603020202020204"/>
                 <a:cs typeface="Trebuchet MS" panose="020B0603020202020204"/>
               </a:rPr>
               <a:t>b</a:t>
             </a:r>
             <a:r>
-              <a:rPr sz="2200" spc="-145" dirty="0">
+              <a:rPr sz="2200" spc="-140" dirty="0">
+                <a:latin typeface="Trebuchet MS" panose="020B0603020202020204"/>
+                <a:cs typeface="Trebuchet MS" panose="020B0603020202020204"/>
+              </a:rPr>
+              <a:t>l</a:t>
+            </a:r>
+            <a:r>
+              <a:rPr sz="2200" spc="-100" dirty="0">
+                <a:latin typeface="Trebuchet MS" panose="020B0603020202020204"/>
+                <a:cs typeface="Trebuchet MS" panose="020B0603020202020204"/>
+              </a:rPr>
+              <a:t>e</a:t>
+            </a:r>
+            <a:r>
+              <a:rPr sz="2200" spc="-195" dirty="0">
+                <a:latin typeface="Trebuchet MS" panose="020B0603020202020204"/>
+                <a:cs typeface="Trebuchet MS" panose="020B0603020202020204"/>
+              </a:rPr>
+              <a:t> </a:t>
+            </a:r>
+            <a:r>
+              <a:rPr sz="2200" spc="-70" dirty="0">
+                <a:latin typeface="Trebuchet MS" panose="020B0603020202020204"/>
+                <a:cs typeface="Trebuchet MS" panose="020B0603020202020204"/>
+              </a:rPr>
+              <a:t>wi</a:t>
+            </a:r>
+            <a:r>
+              <a:rPr sz="2200" spc="-65" dirty="0">
+                <a:latin typeface="Trebuchet MS" panose="020B0603020202020204"/>
+                <a:cs typeface="Trebuchet MS" panose="020B0603020202020204"/>
+              </a:rPr>
+              <a:t>th</a:t>
+            </a:r>
+            <a:r>
+              <a:rPr sz="2200" spc="-195" dirty="0">
+                <a:latin typeface="Trebuchet MS" panose="020B0603020202020204"/>
+                <a:cs typeface="Trebuchet MS" panose="020B0603020202020204"/>
+              </a:rPr>
+              <a:t> </a:t>
+            </a:r>
+            <a:r>
+              <a:rPr sz="2200" spc="-105" dirty="0">
+                <a:latin typeface="Trebuchet MS" panose="020B0603020202020204"/>
+                <a:cs typeface="Trebuchet MS" panose="020B0603020202020204"/>
+              </a:rPr>
+              <a:t>a</a:t>
+            </a:r>
+            <a:r>
+              <a:rPr sz="2200" spc="-110" dirty="0">
+                <a:latin typeface="Trebuchet MS" panose="020B0603020202020204"/>
+                <a:cs typeface="Trebuchet MS" panose="020B0603020202020204"/>
+              </a:rPr>
+              <a:t>c</a:t>
+            </a:r>
+            <a:r>
+              <a:rPr sz="2200" spc="-55" dirty="0">
                 <a:latin typeface="Trebuchet MS" panose="020B0603020202020204"/>
                 <a:cs typeface="Trebuchet MS" panose="020B0603020202020204"/>
               </a:rPr>
               <a:t>t</a:t>
             </a:r>
             <a:r>
-              <a:rPr sz="2200" spc="-105" dirty="0">
-                <a:latin typeface="Trebuchet MS" panose="020B0603020202020204"/>
-                <a:cs typeface="Trebuchet MS" panose="020B0603020202020204"/>
-              </a:rPr>
-              <a:t>a</a:t>
-            </a:r>
-            <a:r>
-              <a:rPr sz="2200" spc="-35" dirty="0">
-                <a:latin typeface="Trebuchet MS" panose="020B0603020202020204"/>
-                <a:cs typeface="Trebuchet MS" panose="020B0603020202020204"/>
-              </a:rPr>
-              <a:t>s</a:t>
-            </a:r>
-            <a:r>
               <a:rPr sz="2200" spc="-80" dirty="0">
                 <a:latin typeface="Trebuchet MS" panose="020B0603020202020204"/>
                 <a:cs typeface="Trebuchet MS" panose="020B0603020202020204"/>
               </a:rPr>
-              <a:t>k</a:t>
-            </a:r>
-            <a:r>
-              <a:rPr sz="2200" spc="-170" dirty="0">
-                <a:latin typeface="Trebuchet MS" panose="020B0603020202020204"/>
-                <a:cs typeface="Trebuchet MS" panose="020B0603020202020204"/>
-              </a:rPr>
-              <a:t> </a:t>
-            </a:r>
-            <a:r>
-              <a:rPr sz="2200" spc="-195" dirty="0">
-                <a:latin typeface="Trebuchet MS" panose="020B0603020202020204"/>
-                <a:cs typeface="Trebuchet MS" panose="020B0603020202020204"/>
-              </a:rPr>
-              <a:t>2:</a:t>
-            </a:r>
-            <a:r>
-              <a:rPr sz="2200" spc="-220" dirty="0">
-                <a:latin typeface="Trebuchet MS" panose="020B0603020202020204"/>
-                <a:cs typeface="Trebuchet MS" panose="020B0603020202020204"/>
-              </a:rPr>
-              <a:t> </a:t>
-            </a:r>
-            <a:r>
-              <a:rPr sz="2200" spc="-90" dirty="0">
-                <a:latin typeface="Trebuchet MS" panose="020B0603020202020204"/>
-                <a:cs typeface="Trebuchet MS" panose="020B0603020202020204"/>
-              </a:rPr>
-              <a:t>I</a:t>
-            </a:r>
-            <a:r>
-              <a:rPr sz="2200" spc="-5" dirty="0">
-                <a:latin typeface="Trebuchet MS" panose="020B0603020202020204"/>
-                <a:cs typeface="Trebuchet MS" panose="020B0603020202020204"/>
-              </a:rPr>
-              <a:t>n</a:t>
-            </a:r>
-            <a:r>
-              <a:rPr sz="2200" spc="-15" dirty="0">
-                <a:latin typeface="Trebuchet MS" panose="020B0603020202020204"/>
-                <a:cs typeface="Trebuchet MS" panose="020B0603020202020204"/>
-              </a:rPr>
-              <a:t>s</a:t>
-            </a:r>
-            <a:r>
-              <a:rPr sz="2200" spc="-120" dirty="0">
-                <a:latin typeface="Trebuchet MS" panose="020B0603020202020204"/>
-                <a:cs typeface="Trebuchet MS" panose="020B0603020202020204"/>
-              </a:rPr>
-              <a:t>er</a:t>
-            </a:r>
-            <a:r>
-              <a:rPr sz="2200" spc="-150" dirty="0">
-                <a:latin typeface="Trebuchet MS" panose="020B0603020202020204"/>
-                <a:cs typeface="Trebuchet MS" panose="020B0603020202020204"/>
-              </a:rPr>
-              <a:t>t</a:t>
-            </a:r>
-            <a:r>
-              <a:rPr sz="2200" spc="-195" dirty="0">
-                <a:latin typeface="Trebuchet MS" panose="020B0603020202020204"/>
-                <a:cs typeface="Trebuchet MS" panose="020B0603020202020204"/>
-              </a:rPr>
-              <a:t> </a:t>
-            </a:r>
-            <a:r>
-              <a:rPr sz="2200" spc="-100" dirty="0">
-                <a:latin typeface="Trebuchet MS" panose="020B0603020202020204"/>
-                <a:cs typeface="Trebuchet MS" panose="020B0603020202020204"/>
-              </a:rPr>
-              <a:t>a</a:t>
-            </a:r>
-            <a:r>
-              <a:rPr sz="2200" spc="-200" dirty="0">
-                <a:latin typeface="Trebuchet MS" panose="020B0603020202020204"/>
-                <a:cs typeface="Trebuchet MS" panose="020B0603020202020204"/>
-              </a:rPr>
-              <a:t> </a:t>
-            </a:r>
-            <a:r>
-              <a:rPr sz="2200" spc="-35" dirty="0">
-                <a:latin typeface="Trebuchet MS" panose="020B0603020202020204"/>
-                <a:cs typeface="Trebuchet MS" panose="020B0603020202020204"/>
-              </a:rPr>
-              <a:t>new</a:t>
-            </a:r>
-            <a:r>
-              <a:rPr sz="2200" spc="-195" dirty="0">
-                <a:latin typeface="Trebuchet MS" panose="020B0603020202020204"/>
-                <a:cs typeface="Trebuchet MS" panose="020B0603020202020204"/>
-              </a:rPr>
-              <a:t> </a:t>
+              <a:t>o</a:t>
             </a:r>
             <a:r>
               <a:rPr sz="2200" spc="-140" dirty="0">
@@ -5213,146 +5351,6 @@
               <a:t>r</a:t>
             </a:r>
             <a:r>
-              <a:rPr sz="2200" spc="15" dirty="0">
-                <a:latin typeface="Trebuchet MS" panose="020B0603020202020204"/>
-                <a:cs typeface="Trebuchet MS" panose="020B0603020202020204"/>
-              </a:rPr>
-              <a:t>o</a:t>
-            </a:r>
-            <a:r>
-              <a:rPr sz="2200" spc="-25" dirty="0">
-                <a:latin typeface="Trebuchet MS" panose="020B0603020202020204"/>
-                <a:cs typeface="Trebuchet MS" panose="020B0603020202020204"/>
-              </a:rPr>
-              <a:t>w</a:t>
-            </a:r>
-            <a:r>
-              <a:rPr sz="2200" spc="-170" dirty="0">
-                <a:latin typeface="Trebuchet MS" panose="020B0603020202020204"/>
-                <a:cs typeface="Trebuchet MS" panose="020B0603020202020204"/>
-              </a:rPr>
-              <a:t> </a:t>
-            </a:r>
-            <a:r>
-              <a:rPr sz="2200" spc="-114" dirty="0">
-                <a:latin typeface="Trebuchet MS" panose="020B0603020202020204"/>
-                <a:cs typeface="Trebuchet MS" panose="020B0603020202020204"/>
-              </a:rPr>
-              <a:t>i</a:t>
-            </a:r>
-            <a:r>
-              <a:rPr sz="2200" spc="-35" dirty="0">
-                <a:latin typeface="Trebuchet MS" panose="020B0603020202020204"/>
-                <a:cs typeface="Trebuchet MS" panose="020B0603020202020204"/>
-              </a:rPr>
-              <a:t>nto</a:t>
-            </a:r>
-            <a:r>
-              <a:rPr sz="2200" spc="-215" dirty="0">
-                <a:latin typeface="Trebuchet MS" panose="020B0603020202020204"/>
-                <a:cs typeface="Trebuchet MS" panose="020B0603020202020204"/>
-              </a:rPr>
-              <a:t> </a:t>
-            </a:r>
-            <a:r>
-              <a:rPr sz="2200" spc="-105" dirty="0">
-                <a:latin typeface="Trebuchet MS" panose="020B0603020202020204"/>
-                <a:cs typeface="Trebuchet MS" panose="020B0603020202020204"/>
-              </a:rPr>
-              <a:t>t</a:t>
-            </a:r>
-            <a:r>
-              <a:rPr sz="2200" spc="-145" dirty="0">
-                <a:latin typeface="Trebuchet MS" panose="020B0603020202020204"/>
-                <a:cs typeface="Trebuchet MS" panose="020B0603020202020204"/>
-              </a:rPr>
-              <a:t>a</a:t>
-            </a:r>
-            <a:r>
-              <a:rPr sz="2200" spc="15" dirty="0">
-                <a:latin typeface="Trebuchet MS" panose="020B0603020202020204"/>
-                <a:cs typeface="Trebuchet MS" panose="020B0603020202020204"/>
-              </a:rPr>
-              <a:t>b</a:t>
-            </a:r>
-            <a:r>
-              <a:rPr sz="2200" spc="-140" dirty="0">
-                <a:latin typeface="Trebuchet MS" panose="020B0603020202020204"/>
-                <a:cs typeface="Trebuchet MS" panose="020B0603020202020204"/>
-              </a:rPr>
-              <a:t>l</a:t>
-            </a:r>
-            <a:r>
-              <a:rPr sz="2200" spc="-100" dirty="0">
-                <a:latin typeface="Trebuchet MS" panose="020B0603020202020204"/>
-                <a:cs typeface="Trebuchet MS" panose="020B0603020202020204"/>
-              </a:rPr>
-              <a:t>e</a:t>
-            </a:r>
-            <a:r>
-              <a:rPr sz="2200" spc="-195" dirty="0">
-                <a:latin typeface="Trebuchet MS" panose="020B0603020202020204"/>
-                <a:cs typeface="Trebuchet MS" panose="020B0603020202020204"/>
-              </a:rPr>
-              <a:t> </a:t>
-            </a:r>
-            <a:r>
-              <a:rPr sz="2200" spc="-70" dirty="0">
-                <a:latin typeface="Trebuchet MS" panose="020B0603020202020204"/>
-                <a:cs typeface="Trebuchet MS" panose="020B0603020202020204"/>
-              </a:rPr>
-              <a:t>wi</a:t>
-            </a:r>
-            <a:r>
-              <a:rPr sz="2200" spc="-65" dirty="0">
-                <a:latin typeface="Trebuchet MS" panose="020B0603020202020204"/>
-                <a:cs typeface="Trebuchet MS" panose="020B0603020202020204"/>
-              </a:rPr>
-              <a:t>th</a:t>
-            </a:r>
-            <a:r>
-              <a:rPr sz="2200" spc="-195" dirty="0">
-                <a:latin typeface="Trebuchet MS" panose="020B0603020202020204"/>
-                <a:cs typeface="Trebuchet MS" panose="020B0603020202020204"/>
-              </a:rPr>
-              <a:t> </a:t>
-            </a:r>
-            <a:r>
-              <a:rPr sz="2200" spc="-105" dirty="0">
-                <a:latin typeface="Trebuchet MS" panose="020B0603020202020204"/>
-                <a:cs typeface="Trebuchet MS" panose="020B0603020202020204"/>
-              </a:rPr>
-              <a:t>a</a:t>
-            </a:r>
-            <a:r>
-              <a:rPr sz="2200" spc="-110" dirty="0">
-                <a:latin typeface="Trebuchet MS" panose="020B0603020202020204"/>
-                <a:cs typeface="Trebuchet MS" panose="020B0603020202020204"/>
-              </a:rPr>
-              <a:t>c</a:t>
-            </a:r>
-            <a:r>
-              <a:rPr sz="2200" spc="-55" dirty="0">
-                <a:latin typeface="Trebuchet MS" panose="020B0603020202020204"/>
-                <a:cs typeface="Trebuchet MS" panose="020B0603020202020204"/>
-              </a:rPr>
-              <a:t>t</a:t>
-            </a:r>
-            <a:r>
-              <a:rPr sz="2200" spc="-80" dirty="0">
-                <a:latin typeface="Trebuchet MS" panose="020B0603020202020204"/>
-                <a:cs typeface="Trebuchet MS" panose="020B0603020202020204"/>
-              </a:rPr>
-              <a:t>o</a:t>
-            </a:r>
-            <a:r>
-              <a:rPr sz="2200" spc="-140" dirty="0">
-                <a:latin typeface="Trebuchet MS" panose="020B0603020202020204"/>
-                <a:cs typeface="Trebuchet MS" panose="020B0603020202020204"/>
-              </a:rPr>
-              <a:t>r</a:t>
-            </a:r>
-            <a:r>
               <a:rPr sz="2200" spc="-185" dirty="0">
                 <a:latin typeface="Trebuchet MS" panose="020B0603020202020204"/>
                 <a:cs typeface="Trebuchet MS" panose="020B0603020202020204"/>
@@ -5364,14 +5362,7 @@
                 <a:latin typeface="Trebuchet MS" panose="020B0603020202020204"/>
                 <a:cs typeface="Trebuchet MS" panose="020B0603020202020204"/>
               </a:rPr>
-              <a:t>n</a:t>
-            </a:r>
-            <a:r>
-              <a:rPr sz="2200" spc="-45" dirty="0">
-                <a:latin typeface="Trebuchet MS" panose="020B0603020202020204"/>
-                <a:cs typeface="Trebuchet MS" panose="020B0603020202020204"/>
-              </a:rPr>
-              <a:t>a</a:t>
+              <a:t>na</a:t>
             </a:r>
             <a:r>
               <a:rPr sz="2200" spc="-50" dirty="0">
@@ -5449,9 +5440,11 @@
         <p:spPr/>
         <p:txBody>
           <a:bodyPr/>
+          <a:lstStyle/>
           <a:p>
             <a:fld id="{B6F15528-21DE-4FAA-801E-634DDDAF4B2B}" type="slidenum">
               <a:rPr/>
+              <a:t>5</a:t>
             </a:fld>
             <a:endParaRPr/>
           </a:p>
@@ -5551,7 +5544,6 @@
               <a:rPr lang="en-US" spc="-235" dirty="0"/>
               <a:t>2</a:t>
             </a:r>
-            <a:endParaRPr lang="en-US" spc="-235" dirty="0"/>
           </a:p>
         </p:txBody>
       </p:sp>
@@ -6089,14 +6081,7 @@
                 <a:latin typeface="Trebuchet MS" panose="020B0603020202020204"/>
                 <a:cs typeface="Trebuchet MS" panose="020B0603020202020204"/>
               </a:rPr>
-              <a:t>n</a:t>
-            </a:r>
-            <a:r>
-              <a:rPr sz="2200" spc="-45" dirty="0">
-                <a:latin typeface="Trebuchet MS" panose="020B0603020202020204"/>
-                <a:cs typeface="Trebuchet MS" panose="020B0603020202020204"/>
-              </a:rPr>
-              <a:t>a</a:t>
+              <a:t>na</a:t>
             </a:r>
             <a:r>
               <a:rPr sz="2200" spc="-50" dirty="0">
@@ -6251,9 +6236,11 @@
         <p:spPr/>
         <p:txBody>
           <a:bodyPr/>
+          <a:lstStyle/>
           <a:p>
             <a:fld id="{B6F15528-21DE-4FAA-801E-634DDDAF4B2B}" type="slidenum">
               <a:rPr/>
+              <a:t>6</a:t>
             </a:fld>
             <a:endParaRPr/>
           </a:p>
@@ -6321,7 +6308,6 @@
               <a:rPr spc="-215" dirty="0"/>
               <a:t>Summary</a:t>
             </a:r>
-            <a:endParaRPr spc="-215" dirty="0"/>
           </a:p>
         </p:txBody>
       </p:sp>
@@ -6807,10 +6793,6 @@
               </a:rPr>
               <a:t>.</a:t>
             </a:r>
-            <a:endParaRPr lang="en-US" sz="2400" b="1" spc="-135" dirty="0">
-              <a:latin typeface="Tahoma" panose="020B0604030504040204"/>
-              <a:cs typeface="Tahoma" panose="020B0604030504040204"/>
-            </a:endParaRPr>
           </a:p>
         </p:txBody>
       </p:sp>
@@ -6821,7 +6803,7 @@
           <p:nvPr/>
         </p:nvPicPr>
         <p:blipFill>
-          <a:blip r:embed="rId1" cstate="print"/>
+          <a:blip r:embed="rId2" cstate="print"/>
           <a:stretch>
             <a:fillRect/>
           </a:stretch>
@@ -6849,9 +6831,11 @@
         <p:spPr/>
         <p:txBody>
           <a:bodyPr/>
+          <a:lstStyle/>
           <a:p>
             <a:fld id="{B6F15528-21DE-4FAA-801E-634DDDAF4B2B}" type="slidenum">
               <a:rPr/>
+              <a:t>7</a:t>
             </a:fld>
             <a:endParaRPr/>
           </a:p>
@@ -7143,6 +7127,8 @@
       </a:bgFillStyleLst>
     </a:fmtScheme>
   </a:themeElements>
+  <a:objectDefaults/>
+  <a:extraClrSchemeLst/>
   <a:extLst>
     <a:ext uri="{05A4C25C-085E-4340-85A3-A5531E510DB2}">
       <thm15:themeFamily xmlns:thm15="http://schemas.microsoft.com/office/thememl/2012/main" name="Office Theme" id="{62F939B6-93AF-4DB8-9C6B-D6C7DFDC589F}" vid="{4A3C46E8-61CC-4603-A589-7422A47A8E4A}"/>
@@ -7402,6 +7388,8 @@
       </a:bgFillStyleLst>
     </a:fmtScheme>
   </a:themeElements>
+  <a:objectDefaults/>
+  <a:extraClrSchemeLst/>
   <a:extLst>
     <a:ext uri="{05A4C25C-085E-4340-85A3-A5531E510DB2}">
       <thm15:themeFamily xmlns:thm15="http://schemas.microsoft.com/office/thememl/2012/main" name="Office Theme" id="{62F939B6-93AF-4DB8-9C6B-D6C7DFDC589F}" vid="{4A3C46E8-61CC-4603-A589-7422A47A8E4A}"/>

</xml_diff>